<commit_message>
Minor tweaks for main-only and release illusrreations for DevOps. Move vNext to the right.
</commit_message>
<xml_diff>
--- a/src/Branching/TFVC Illustration Collection 1 New Style.pptx
+++ b/src/Branching/TFVC Illustration Collection 1 New Style.pptx
@@ -35287,14 +35287,16 @@
         <p:nvCxnSpPr>
           <p:cNvPr id="112" name="Straight Arrow Connector 111"/>
           <p:cNvCxnSpPr>
+            <a:cxnSpLocks/>
             <a:stCxn id="67" idx="6"/>
+            <a:endCxn id="25" idx="1"/>
           </p:cNvCxnSpPr>
           <p:nvPr/>
         </p:nvCxnSpPr>
         <p:spPr>
           <a:xfrm flipV="1">
             <a:off x="9077419" y="3351227"/>
-            <a:ext cx="1841809" cy="1"/>
+            <a:ext cx="1265561" cy="1"/>
           </a:xfrm>
           <a:prstGeom prst="straightConnector1">
             <a:avLst/>
@@ -35457,8 +35459,8 @@
         </p:nvSpPr>
         <p:spPr>
           <a:xfrm>
-            <a:off x="851492" y="3043451"/>
-            <a:ext cx="569067" cy="615553"/>
+            <a:off x="832002" y="3197339"/>
+            <a:ext cx="527388" cy="307777"/>
           </a:xfrm>
           <a:prstGeom prst="rect">
             <a:avLst/>
@@ -35483,38 +35485,6 @@
               </a:rPr>
               <a:t>main</a:t>
             </a:r>
-            <a:br>
-              <a:rPr lang="en-CA" sz="2000" dirty="0">
-                <a:solidFill>
-                  <a:schemeClr val="tx1">
-                    <a:lumMod val="65000"/>
-                    <a:lumOff val="35000"/>
-                  </a:schemeClr>
-                </a:solidFill>
-                <a:latin typeface="Segoe UI Light" pitchFamily="34" charset="0"/>
-              </a:rPr>
-            </a:br>
-            <a:r>
-              <a:rPr lang="en-CA" sz="2000" dirty="0" err="1">
-                <a:solidFill>
-                  <a:schemeClr val="tx1">
-                    <a:lumMod val="65000"/>
-                    <a:lumOff val="35000"/>
-                  </a:schemeClr>
-                </a:solidFill>
-                <a:latin typeface="Segoe UI Light" pitchFamily="34" charset="0"/>
-              </a:rPr>
-              <a:t>vnext</a:t>
-            </a:r>
-            <a:endParaRPr lang="en-CA" sz="2000" dirty="0">
-              <a:solidFill>
-                <a:schemeClr val="tx1">
-                  <a:lumMod val="65000"/>
-                  <a:lumOff val="35000"/>
-                </a:schemeClr>
-              </a:solidFill>
-              <a:latin typeface="Segoe UI Light" pitchFamily="34" charset="0"/>
-            </a:endParaRPr>
           </a:p>
         </p:txBody>
       </p:sp>
@@ -35529,8 +35499,8 @@
         </p:nvCxnSpPr>
         <p:spPr>
           <a:xfrm>
-            <a:off x="1420559" y="3351228"/>
-            <a:ext cx="662766" cy="0"/>
+            <a:off x="1359390" y="3351228"/>
+            <a:ext cx="723935" cy="0"/>
           </a:xfrm>
           <a:prstGeom prst="straightConnector1">
             <a:avLst/>
@@ -36136,6 +36106,70 @@
               </a:rPr>
               <a:t>Iteration4</a:t>
             </a:r>
+          </a:p>
+        </p:txBody>
+      </p:sp>
+      <p:sp>
+        <p:nvSpPr>
+          <p:cNvPr id="25" name="TextBox 24">
+            <a:extLst>
+              <a:ext uri="{FF2B5EF4-FFF2-40B4-BE49-F238E27FC236}">
+                <a16:creationId xmlns:a16="http://schemas.microsoft.com/office/drawing/2014/main" id="{24FF450B-2DCC-4C04-8095-A519B20A104D}"/>
+              </a:ext>
+            </a:extLst>
+          </p:cNvPr>
+          <p:cNvSpPr txBox="1"/>
+          <p:nvPr/>
+        </p:nvSpPr>
+        <p:spPr>
+          <a:xfrm>
+            <a:off x="10342980" y="3197338"/>
+            <a:ext cx="639599" cy="307777"/>
+          </a:xfrm>
+          <a:prstGeom prst="rect">
+            <a:avLst/>
+          </a:prstGeom>
+          <a:noFill/>
+        </p:spPr>
+        <p:txBody>
+          <a:bodyPr wrap="none" lIns="0" tIns="0" rIns="0" bIns="0" rtlCol="0">
+            <a:spAutoFit/>
+          </a:bodyPr>
+          <a:lstStyle/>
+          <a:p>
+            <a:r>
+              <a:rPr lang="en-CA" sz="2000" dirty="0">
+                <a:solidFill>
+                  <a:schemeClr val="tx1">
+                    <a:lumMod val="65000"/>
+                    <a:lumOff val="35000"/>
+                  </a:schemeClr>
+                </a:solidFill>
+                <a:latin typeface="Segoe UI Light" pitchFamily="34" charset="0"/>
+              </a:rPr>
+              <a:t> </a:t>
+            </a:r>
+            <a:r>
+              <a:rPr lang="en-CA" sz="2000" dirty="0" err="1">
+                <a:solidFill>
+                  <a:schemeClr val="tx1">
+                    <a:lumMod val="65000"/>
+                    <a:lumOff val="35000"/>
+                  </a:schemeClr>
+                </a:solidFill>
+                <a:latin typeface="Segoe UI Light" pitchFamily="34" charset="0"/>
+              </a:rPr>
+              <a:t>vnext</a:t>
+            </a:r>
+            <a:endParaRPr lang="en-CA" sz="2000" dirty="0">
+              <a:solidFill>
+                <a:schemeClr val="tx1">
+                  <a:lumMod val="65000"/>
+                  <a:lumOff val="35000"/>
+                </a:schemeClr>
+              </a:solidFill>
+              <a:latin typeface="Segoe UI Light" pitchFamily="34" charset="0"/>
+            </a:endParaRPr>
           </a:p>
         </p:txBody>
       </p:sp>
@@ -48504,14 +48538,16 @@
         <p:nvCxnSpPr>
           <p:cNvPr id="5" name="Straight Arrow Connector 4"/>
           <p:cNvCxnSpPr>
+            <a:cxnSpLocks/>
             <a:stCxn id="83" idx="6"/>
+            <a:endCxn id="35" idx="1"/>
           </p:cNvCxnSpPr>
           <p:nvPr/>
         </p:nvCxnSpPr>
         <p:spPr>
-          <a:xfrm>
-            <a:off x="9075922" y="2484823"/>
-            <a:ext cx="1868359" cy="15429"/>
+          <a:xfrm flipV="1">
+            <a:off x="9075922" y="2482326"/>
+            <a:ext cx="1239314" cy="2497"/>
           </a:xfrm>
           <a:prstGeom prst="straightConnector1">
             <a:avLst/>
@@ -48877,8 +48913,8 @@
         </p:nvSpPr>
         <p:spPr>
           <a:xfrm>
-            <a:off x="876302" y="2192475"/>
-            <a:ext cx="656339" cy="615553"/>
+            <a:off x="880081" y="2347256"/>
+            <a:ext cx="656339" cy="307777"/>
           </a:xfrm>
           <a:prstGeom prst="rect">
             <a:avLst/>
@@ -48903,38 +48939,6 @@
               </a:rPr>
               <a:t>main</a:t>
             </a:r>
-            <a:br>
-              <a:rPr lang="en-CA" sz="2000" dirty="0">
-                <a:solidFill>
-                  <a:schemeClr val="tx1">
-                    <a:lumMod val="65000"/>
-                    <a:lumOff val="35000"/>
-                  </a:schemeClr>
-                </a:solidFill>
-                <a:latin typeface="Segoe UI Light" pitchFamily="34" charset="0"/>
-              </a:rPr>
-            </a:br>
-            <a:r>
-              <a:rPr lang="en-CA" sz="2000" dirty="0" err="1">
-                <a:solidFill>
-                  <a:schemeClr val="tx1">
-                    <a:lumMod val="65000"/>
-                    <a:lumOff val="35000"/>
-                  </a:schemeClr>
-                </a:solidFill>
-                <a:latin typeface="Segoe UI Light" pitchFamily="34" charset="0"/>
-              </a:rPr>
-              <a:t>vnext</a:t>
-            </a:r>
-            <a:endParaRPr lang="en-CA" sz="2000" dirty="0">
-              <a:solidFill>
-                <a:schemeClr val="tx1">
-                  <a:lumMod val="65000"/>
-                  <a:lumOff val="35000"/>
-                </a:schemeClr>
-              </a:solidFill>
-              <a:latin typeface="Segoe UI Light" pitchFamily="34" charset="0"/>
-            </a:endParaRPr>
           </a:p>
         </p:txBody>
       </p:sp>
@@ -48950,8 +48954,8 @@
         </p:nvCxnSpPr>
         <p:spPr>
           <a:xfrm flipH="1">
-            <a:off x="1532641" y="2500252"/>
-            <a:ext cx="336465" cy="0"/>
+            <a:off x="1536420" y="2500252"/>
+            <a:ext cx="332686" cy="893"/>
           </a:xfrm>
           <a:prstGeom prst="straightConnector1">
             <a:avLst/>
@@ -49917,6 +49921,70 @@
               </a:rPr>
               <a:t>C</a:t>
             </a:r>
+          </a:p>
+        </p:txBody>
+      </p:sp>
+      <p:sp>
+        <p:nvSpPr>
+          <p:cNvPr id="35" name="TextBox 34">
+            <a:extLst>
+              <a:ext uri="{FF2B5EF4-FFF2-40B4-BE49-F238E27FC236}">
+                <a16:creationId xmlns:a16="http://schemas.microsoft.com/office/drawing/2014/main" id="{F440B7C0-23E7-4BA4-95AF-42DEC001F74E}"/>
+              </a:ext>
+            </a:extLst>
+          </p:cNvPr>
+          <p:cNvSpPr txBox="1"/>
+          <p:nvPr/>
+        </p:nvSpPr>
+        <p:spPr>
+          <a:xfrm>
+            <a:off x="10315236" y="2328437"/>
+            <a:ext cx="639599" cy="307777"/>
+          </a:xfrm>
+          <a:prstGeom prst="rect">
+            <a:avLst/>
+          </a:prstGeom>
+          <a:noFill/>
+        </p:spPr>
+        <p:txBody>
+          <a:bodyPr wrap="none" lIns="0" tIns="0" rIns="0" bIns="0" rtlCol="0">
+            <a:spAutoFit/>
+          </a:bodyPr>
+          <a:lstStyle/>
+          <a:p>
+            <a:r>
+              <a:rPr lang="en-CA" sz="2000" dirty="0">
+                <a:solidFill>
+                  <a:schemeClr val="tx1">
+                    <a:lumMod val="65000"/>
+                    <a:lumOff val="35000"/>
+                  </a:schemeClr>
+                </a:solidFill>
+                <a:latin typeface="Segoe UI Light" pitchFamily="34" charset="0"/>
+              </a:rPr>
+              <a:t> </a:t>
+            </a:r>
+            <a:r>
+              <a:rPr lang="en-CA" sz="2000" dirty="0" err="1">
+                <a:solidFill>
+                  <a:schemeClr val="tx1">
+                    <a:lumMod val="65000"/>
+                    <a:lumOff val="35000"/>
+                  </a:schemeClr>
+                </a:solidFill>
+                <a:latin typeface="Segoe UI Light" pitchFamily="34" charset="0"/>
+              </a:rPr>
+              <a:t>vnext</a:t>
+            </a:r>
+            <a:endParaRPr lang="en-CA" sz="2000" dirty="0">
+              <a:solidFill>
+                <a:schemeClr val="tx1">
+                  <a:lumMod val="65000"/>
+                  <a:lumOff val="35000"/>
+                </a:schemeClr>
+              </a:solidFill>
+              <a:latin typeface="Segoe UI Light" pitchFamily="34" charset="0"/>
+            </a:endParaRPr>
           </a:p>
         </p:txBody>
       </p:sp>

</xml_diff>

<commit_message>
Update content based on feedbcak from Steve St. Jean.
</commit_message>
<xml_diff>
--- a/src/Branching/TFVC Illustration Collection 1 New Style.pptx
+++ b/src/Branching/TFVC Illustration Collection 1 New Style.pptx
@@ -260,7 +260,7 @@
           <a:p>
             <a:fld id="{8A8F1003-D25F-438A-B75F-2326FCAC45A1}" type="datetimeFigureOut">
               <a:rPr lang="en-CA" smtClean="0"/>
-              <a:t>2017-03-08</a:t>
+              <a:t>2017-03-15</a:t>
             </a:fld>
             <a:endParaRPr lang="en-CA"/>
           </a:p>
@@ -430,7 +430,7 @@
           <a:p>
             <a:fld id="{8A8F1003-D25F-438A-B75F-2326FCAC45A1}" type="datetimeFigureOut">
               <a:rPr lang="en-CA" smtClean="0"/>
-              <a:t>2017-03-08</a:t>
+              <a:t>2017-03-15</a:t>
             </a:fld>
             <a:endParaRPr lang="en-CA"/>
           </a:p>
@@ -610,7 +610,7 @@
           <a:p>
             <a:fld id="{8A8F1003-D25F-438A-B75F-2326FCAC45A1}" type="datetimeFigureOut">
               <a:rPr lang="en-CA" smtClean="0"/>
-              <a:t>2017-03-08</a:t>
+              <a:t>2017-03-15</a:t>
             </a:fld>
             <a:endParaRPr lang="en-CA"/>
           </a:p>
@@ -929,7 +929,7 @@
           <a:p>
             <a:fld id="{8A8F1003-D25F-438A-B75F-2326FCAC45A1}" type="datetimeFigureOut">
               <a:rPr lang="en-CA" smtClean="0"/>
-              <a:t>2017-03-08</a:t>
+              <a:t>2017-03-15</a:t>
             </a:fld>
             <a:endParaRPr lang="en-CA"/>
           </a:p>
@@ -1175,7 +1175,7 @@
           <a:p>
             <a:fld id="{8A8F1003-D25F-438A-B75F-2326FCAC45A1}" type="datetimeFigureOut">
               <a:rPr lang="en-CA" smtClean="0"/>
-              <a:t>2017-03-08</a:t>
+              <a:t>2017-03-15</a:t>
             </a:fld>
             <a:endParaRPr lang="en-CA"/>
           </a:p>
@@ -1407,7 +1407,7 @@
           <a:p>
             <a:fld id="{8A8F1003-D25F-438A-B75F-2326FCAC45A1}" type="datetimeFigureOut">
               <a:rPr lang="en-CA" smtClean="0"/>
-              <a:t>2017-03-08</a:t>
+              <a:t>2017-03-15</a:t>
             </a:fld>
             <a:endParaRPr lang="en-CA"/>
           </a:p>
@@ -1774,7 +1774,7 @@
           <a:p>
             <a:fld id="{8A8F1003-D25F-438A-B75F-2326FCAC45A1}" type="datetimeFigureOut">
               <a:rPr lang="en-CA" smtClean="0"/>
-              <a:t>2017-03-08</a:t>
+              <a:t>2017-03-15</a:t>
             </a:fld>
             <a:endParaRPr lang="en-CA"/>
           </a:p>
@@ -1892,7 +1892,7 @@
           <a:p>
             <a:fld id="{8A8F1003-D25F-438A-B75F-2326FCAC45A1}" type="datetimeFigureOut">
               <a:rPr lang="en-CA" smtClean="0"/>
-              <a:t>2017-03-08</a:t>
+              <a:t>2017-03-15</a:t>
             </a:fld>
             <a:endParaRPr lang="en-CA"/>
           </a:p>
@@ -1987,7 +1987,7 @@
           <a:p>
             <a:fld id="{8A8F1003-D25F-438A-B75F-2326FCAC45A1}" type="datetimeFigureOut">
               <a:rPr lang="en-CA" smtClean="0"/>
-              <a:t>2017-03-08</a:t>
+              <a:t>2017-03-15</a:t>
             </a:fld>
             <a:endParaRPr lang="en-CA"/>
           </a:p>
@@ -2264,7 +2264,7 @@
           <a:p>
             <a:fld id="{8A8F1003-D25F-438A-B75F-2326FCAC45A1}" type="datetimeFigureOut">
               <a:rPr lang="en-CA" smtClean="0"/>
-              <a:t>2017-03-08</a:t>
+              <a:t>2017-03-15</a:t>
             </a:fld>
             <a:endParaRPr lang="en-CA"/>
           </a:p>
@@ -2517,7 +2517,7 @@
           <a:p>
             <a:fld id="{8A8F1003-D25F-438A-B75F-2326FCAC45A1}" type="datetimeFigureOut">
               <a:rPr lang="en-CA" smtClean="0"/>
-              <a:t>2017-03-08</a:t>
+              <a:t>2017-03-15</a:t>
             </a:fld>
             <a:endParaRPr lang="en-CA"/>
           </a:p>
@@ -2730,7 +2730,7 @@
           <a:p>
             <a:fld id="{8A8F1003-D25F-438A-B75F-2326FCAC45A1}" type="datetimeFigureOut">
               <a:rPr lang="en-CA" smtClean="0"/>
-              <a:t>2017-03-08</a:t>
+              <a:t>2017-03-15</a:t>
             </a:fld>
             <a:endParaRPr lang="en-CA"/>
           </a:p>
@@ -50676,8 +50676,8 @@
         </p:nvSpPr>
         <p:spPr>
           <a:xfrm>
-            <a:off x="3870594" y="3647626"/>
-            <a:ext cx="868828" cy="307777"/>
+            <a:off x="4116641" y="3641060"/>
+            <a:ext cx="436017" cy="307777"/>
           </a:xfrm>
           <a:prstGeom prst="rect">
             <a:avLst/>
@@ -50700,7 +50700,7 @@
                 </a:solidFill>
                 <a:latin typeface="Segoe UI Light" pitchFamily="34" charset="0"/>
               </a:rPr>
-              <a:t>V1.00RC</a:t>
+              <a:t>V1.0</a:t>
             </a:r>
           </a:p>
         </p:txBody>
@@ -51305,7 +51305,7 @@
         <p:spPr>
           <a:xfrm>
             <a:off x="8195160" y="2996995"/>
-            <a:ext cx="1064394" cy="307777"/>
+            <a:ext cx="625171" cy="307777"/>
           </a:xfrm>
           <a:prstGeom prst="rect">
             <a:avLst/>
@@ -51328,7 +51328,7 @@
                 </a:solidFill>
                 <a:latin typeface="Segoe UI Light" pitchFamily="34" charset="0"/>
               </a:rPr>
-              <a:t>Hot patch</a:t>
+              <a:t>Hotfix</a:t>
             </a:r>
           </a:p>
         </p:txBody>
@@ -52354,8 +52354,8 @@
         </p:nvSpPr>
         <p:spPr>
           <a:xfrm>
-            <a:off x="2742834" y="4836346"/>
-            <a:ext cx="868828" cy="307777"/>
+            <a:off x="2967779" y="4828819"/>
+            <a:ext cx="567463" cy="307777"/>
           </a:xfrm>
           <a:prstGeom prst="rect">
             <a:avLst/>
@@ -52378,7 +52378,7 @@
                 </a:solidFill>
                 <a:latin typeface="Segoe UI Light" pitchFamily="34" charset="0"/>
               </a:rPr>
-              <a:t>V1.00RC</a:t>
+              <a:t>V1.00</a:t>
             </a:r>
           </a:p>
         </p:txBody>
@@ -53139,7 +53139,7 @@
         </p:nvSpPr>
         <p:spPr>
           <a:xfrm>
-            <a:off x="783277" y="2316480"/>
+            <a:off x="850689" y="2335660"/>
             <a:ext cx="10231120" cy="3493846"/>
           </a:xfrm>
           <a:prstGeom prst="rect">
@@ -53682,7 +53682,7 @@
         <p:spPr>
           <a:xfrm>
             <a:off x="6497423" y="4836041"/>
-            <a:ext cx="908903" cy="307777"/>
+            <a:ext cx="607539" cy="307777"/>
           </a:xfrm>
           <a:prstGeom prst="rect">
             <a:avLst/>
@@ -53705,7 +53705,7 @@
                 </a:solidFill>
                 <a:latin typeface="Segoe UI Light" pitchFamily="34" charset="0"/>
               </a:rPr>
-              <a:t>V2.00RC</a:t>
+              <a:t>V2.00</a:t>
             </a:r>
           </a:p>
         </p:txBody>
@@ -54872,6 +54872,92 @@
             <a:r>
               <a:rPr lang="en-CA" dirty="0"/>
               <a:t>RI</a:t>
+            </a:r>
+          </a:p>
+        </p:txBody>
+      </p:sp>
+      <p:sp>
+        <p:nvSpPr>
+          <p:cNvPr id="57" name="TextBox 56">
+            <a:extLst>
+              <a:ext uri="{FF2B5EF4-FFF2-40B4-BE49-F238E27FC236}">
+                <a16:creationId xmlns:a16="http://schemas.microsoft.com/office/drawing/2014/main" id="{7A9C94A4-4E35-4966-A5BE-F68066D1AFC0}"/>
+              </a:ext>
+            </a:extLst>
+          </p:cNvPr>
+          <p:cNvSpPr txBox="1"/>
+          <p:nvPr/>
+        </p:nvSpPr>
+        <p:spPr>
+          <a:xfrm>
+            <a:off x="5966249" y="4185409"/>
+            <a:ext cx="625171" cy="307777"/>
+          </a:xfrm>
+          <a:prstGeom prst="rect">
+            <a:avLst/>
+          </a:prstGeom>
+          <a:noFill/>
+        </p:spPr>
+        <p:txBody>
+          <a:bodyPr wrap="none" lIns="0" tIns="0" rIns="0" bIns="0" rtlCol="0">
+            <a:spAutoFit/>
+          </a:bodyPr>
+          <a:lstStyle/>
+          <a:p>
+            <a:r>
+              <a:rPr lang="en-CA" sz="2000" dirty="0">
+                <a:solidFill>
+                  <a:schemeClr val="tx1">
+                    <a:lumMod val="65000"/>
+                    <a:lumOff val="35000"/>
+                  </a:schemeClr>
+                </a:solidFill>
+                <a:latin typeface="Segoe UI Light" pitchFamily="34" charset="0"/>
+              </a:rPr>
+              <a:t>Hotfix</a:t>
+            </a:r>
+          </a:p>
+        </p:txBody>
+      </p:sp>
+      <p:sp>
+        <p:nvSpPr>
+          <p:cNvPr id="58" name="TextBox 57">
+            <a:extLst>
+              <a:ext uri="{FF2B5EF4-FFF2-40B4-BE49-F238E27FC236}">
+                <a16:creationId xmlns:a16="http://schemas.microsoft.com/office/drawing/2014/main" id="{EF0FA4B3-860E-4B50-AA0E-CD617C50FFB8}"/>
+              </a:ext>
+            </a:extLst>
+          </p:cNvPr>
+          <p:cNvSpPr txBox="1"/>
+          <p:nvPr/>
+        </p:nvSpPr>
+        <p:spPr>
+          <a:xfrm>
+            <a:off x="9497181" y="4181306"/>
+            <a:ext cx="625171" cy="307777"/>
+          </a:xfrm>
+          <a:prstGeom prst="rect">
+            <a:avLst/>
+          </a:prstGeom>
+          <a:noFill/>
+        </p:spPr>
+        <p:txBody>
+          <a:bodyPr wrap="none" lIns="0" tIns="0" rIns="0" bIns="0" rtlCol="0">
+            <a:spAutoFit/>
+          </a:bodyPr>
+          <a:lstStyle/>
+          <a:p>
+            <a:r>
+              <a:rPr lang="en-CA" sz="2000" dirty="0">
+                <a:solidFill>
+                  <a:schemeClr val="tx1">
+                    <a:lumMod val="65000"/>
+                    <a:lumOff val="35000"/>
+                  </a:schemeClr>
+                </a:solidFill>
+                <a:latin typeface="Segoe UI Light" pitchFamily="34" charset="0"/>
+              </a:rPr>
+              <a:t>Hotfix</a:t>
             </a:r>
           </a:p>
         </p:txBody>

</xml_diff>

<commit_message>
Articles/branching/sergioa/effective tfvc branching strategies devops (#7)
* Push latest markdown conversion from Sergio's DRAFT

* Update content based on feedbcak from Steve St. Jean.

* Change copyright from 2015 to 2017

* Change "do not" to a softer "avoid"

* Edited RC out.  Added section about hotfix

Edited out the RC that was left in the body text.  Added a section discussing what happens when v2.00 becomes the release candidate and v1.0 is still in produciton (hotfix).  Expanded and cleaned up the Releasable Unit definition.
</commit_message>
<xml_diff>
--- a/src/Branching/TFVC Illustration Collection 1 New Style.pptx
+++ b/src/Branching/TFVC Illustration Collection 1 New Style.pptx
@@ -260,7 +260,7 @@
           <a:p>
             <a:fld id="{8A8F1003-D25F-438A-B75F-2326FCAC45A1}" type="datetimeFigureOut">
               <a:rPr lang="en-CA" smtClean="0"/>
-              <a:t>2017-03-08</a:t>
+              <a:t>2017-03-15</a:t>
             </a:fld>
             <a:endParaRPr lang="en-CA"/>
           </a:p>
@@ -430,7 +430,7 @@
           <a:p>
             <a:fld id="{8A8F1003-D25F-438A-B75F-2326FCAC45A1}" type="datetimeFigureOut">
               <a:rPr lang="en-CA" smtClean="0"/>
-              <a:t>2017-03-08</a:t>
+              <a:t>2017-03-15</a:t>
             </a:fld>
             <a:endParaRPr lang="en-CA"/>
           </a:p>
@@ -610,7 +610,7 @@
           <a:p>
             <a:fld id="{8A8F1003-D25F-438A-B75F-2326FCAC45A1}" type="datetimeFigureOut">
               <a:rPr lang="en-CA" smtClean="0"/>
-              <a:t>2017-03-08</a:t>
+              <a:t>2017-03-15</a:t>
             </a:fld>
             <a:endParaRPr lang="en-CA"/>
           </a:p>
@@ -929,7 +929,7 @@
           <a:p>
             <a:fld id="{8A8F1003-D25F-438A-B75F-2326FCAC45A1}" type="datetimeFigureOut">
               <a:rPr lang="en-CA" smtClean="0"/>
-              <a:t>2017-03-08</a:t>
+              <a:t>2017-03-15</a:t>
             </a:fld>
             <a:endParaRPr lang="en-CA"/>
           </a:p>
@@ -1175,7 +1175,7 @@
           <a:p>
             <a:fld id="{8A8F1003-D25F-438A-B75F-2326FCAC45A1}" type="datetimeFigureOut">
               <a:rPr lang="en-CA" smtClean="0"/>
-              <a:t>2017-03-08</a:t>
+              <a:t>2017-03-15</a:t>
             </a:fld>
             <a:endParaRPr lang="en-CA"/>
           </a:p>
@@ -1407,7 +1407,7 @@
           <a:p>
             <a:fld id="{8A8F1003-D25F-438A-B75F-2326FCAC45A1}" type="datetimeFigureOut">
               <a:rPr lang="en-CA" smtClean="0"/>
-              <a:t>2017-03-08</a:t>
+              <a:t>2017-03-15</a:t>
             </a:fld>
             <a:endParaRPr lang="en-CA"/>
           </a:p>
@@ -1774,7 +1774,7 @@
           <a:p>
             <a:fld id="{8A8F1003-D25F-438A-B75F-2326FCAC45A1}" type="datetimeFigureOut">
               <a:rPr lang="en-CA" smtClean="0"/>
-              <a:t>2017-03-08</a:t>
+              <a:t>2017-03-15</a:t>
             </a:fld>
             <a:endParaRPr lang="en-CA"/>
           </a:p>
@@ -1892,7 +1892,7 @@
           <a:p>
             <a:fld id="{8A8F1003-D25F-438A-B75F-2326FCAC45A1}" type="datetimeFigureOut">
               <a:rPr lang="en-CA" smtClean="0"/>
-              <a:t>2017-03-08</a:t>
+              <a:t>2017-03-15</a:t>
             </a:fld>
             <a:endParaRPr lang="en-CA"/>
           </a:p>
@@ -1987,7 +1987,7 @@
           <a:p>
             <a:fld id="{8A8F1003-D25F-438A-B75F-2326FCAC45A1}" type="datetimeFigureOut">
               <a:rPr lang="en-CA" smtClean="0"/>
-              <a:t>2017-03-08</a:t>
+              <a:t>2017-03-15</a:t>
             </a:fld>
             <a:endParaRPr lang="en-CA"/>
           </a:p>
@@ -2264,7 +2264,7 @@
           <a:p>
             <a:fld id="{8A8F1003-D25F-438A-B75F-2326FCAC45A1}" type="datetimeFigureOut">
               <a:rPr lang="en-CA" smtClean="0"/>
-              <a:t>2017-03-08</a:t>
+              <a:t>2017-03-15</a:t>
             </a:fld>
             <a:endParaRPr lang="en-CA"/>
           </a:p>
@@ -2517,7 +2517,7 @@
           <a:p>
             <a:fld id="{8A8F1003-D25F-438A-B75F-2326FCAC45A1}" type="datetimeFigureOut">
               <a:rPr lang="en-CA" smtClean="0"/>
-              <a:t>2017-03-08</a:t>
+              <a:t>2017-03-15</a:t>
             </a:fld>
             <a:endParaRPr lang="en-CA"/>
           </a:p>
@@ -2730,7 +2730,7 @@
           <a:p>
             <a:fld id="{8A8F1003-D25F-438A-B75F-2326FCAC45A1}" type="datetimeFigureOut">
               <a:rPr lang="en-CA" smtClean="0"/>
-              <a:t>2017-03-08</a:t>
+              <a:t>2017-03-15</a:t>
             </a:fld>
             <a:endParaRPr lang="en-CA"/>
           </a:p>
@@ -50676,8 +50676,8 @@
         </p:nvSpPr>
         <p:spPr>
           <a:xfrm>
-            <a:off x="3870594" y="3647626"/>
-            <a:ext cx="868828" cy="307777"/>
+            <a:off x="4116641" y="3641060"/>
+            <a:ext cx="436017" cy="307777"/>
           </a:xfrm>
           <a:prstGeom prst="rect">
             <a:avLst/>
@@ -50700,7 +50700,7 @@
                 </a:solidFill>
                 <a:latin typeface="Segoe UI Light" pitchFamily="34" charset="0"/>
               </a:rPr>
-              <a:t>V1.00RC</a:t>
+              <a:t>V1.0</a:t>
             </a:r>
           </a:p>
         </p:txBody>
@@ -51305,7 +51305,7 @@
         <p:spPr>
           <a:xfrm>
             <a:off x="8195160" y="2996995"/>
-            <a:ext cx="1064394" cy="307777"/>
+            <a:ext cx="625171" cy="307777"/>
           </a:xfrm>
           <a:prstGeom prst="rect">
             <a:avLst/>
@@ -51328,7 +51328,7 @@
                 </a:solidFill>
                 <a:latin typeface="Segoe UI Light" pitchFamily="34" charset="0"/>
               </a:rPr>
-              <a:t>Hot patch</a:t>
+              <a:t>Hotfix</a:t>
             </a:r>
           </a:p>
         </p:txBody>
@@ -52354,8 +52354,8 @@
         </p:nvSpPr>
         <p:spPr>
           <a:xfrm>
-            <a:off x="2742834" y="4836346"/>
-            <a:ext cx="868828" cy="307777"/>
+            <a:off x="2967779" y="4828819"/>
+            <a:ext cx="567463" cy="307777"/>
           </a:xfrm>
           <a:prstGeom prst="rect">
             <a:avLst/>
@@ -52378,7 +52378,7 @@
                 </a:solidFill>
                 <a:latin typeface="Segoe UI Light" pitchFamily="34" charset="0"/>
               </a:rPr>
-              <a:t>V1.00RC</a:t>
+              <a:t>V1.00</a:t>
             </a:r>
           </a:p>
         </p:txBody>
@@ -53139,7 +53139,7 @@
         </p:nvSpPr>
         <p:spPr>
           <a:xfrm>
-            <a:off x="783277" y="2316480"/>
+            <a:off x="850689" y="2335660"/>
             <a:ext cx="10231120" cy="3493846"/>
           </a:xfrm>
           <a:prstGeom prst="rect">
@@ -53682,7 +53682,7 @@
         <p:spPr>
           <a:xfrm>
             <a:off x="6497423" y="4836041"/>
-            <a:ext cx="908903" cy="307777"/>
+            <a:ext cx="607539" cy="307777"/>
           </a:xfrm>
           <a:prstGeom prst="rect">
             <a:avLst/>
@@ -53705,7 +53705,7 @@
                 </a:solidFill>
                 <a:latin typeface="Segoe UI Light" pitchFamily="34" charset="0"/>
               </a:rPr>
-              <a:t>V2.00RC</a:t>
+              <a:t>V2.00</a:t>
             </a:r>
           </a:p>
         </p:txBody>
@@ -54872,6 +54872,92 @@
             <a:r>
               <a:rPr lang="en-CA" dirty="0"/>
               <a:t>RI</a:t>
+            </a:r>
+          </a:p>
+        </p:txBody>
+      </p:sp>
+      <p:sp>
+        <p:nvSpPr>
+          <p:cNvPr id="57" name="TextBox 56">
+            <a:extLst>
+              <a:ext uri="{FF2B5EF4-FFF2-40B4-BE49-F238E27FC236}">
+                <a16:creationId xmlns:a16="http://schemas.microsoft.com/office/drawing/2014/main" id="{7A9C94A4-4E35-4966-A5BE-F68066D1AFC0}"/>
+              </a:ext>
+            </a:extLst>
+          </p:cNvPr>
+          <p:cNvSpPr txBox="1"/>
+          <p:nvPr/>
+        </p:nvSpPr>
+        <p:spPr>
+          <a:xfrm>
+            <a:off x="5966249" y="4185409"/>
+            <a:ext cx="625171" cy="307777"/>
+          </a:xfrm>
+          <a:prstGeom prst="rect">
+            <a:avLst/>
+          </a:prstGeom>
+          <a:noFill/>
+        </p:spPr>
+        <p:txBody>
+          <a:bodyPr wrap="none" lIns="0" tIns="0" rIns="0" bIns="0" rtlCol="0">
+            <a:spAutoFit/>
+          </a:bodyPr>
+          <a:lstStyle/>
+          <a:p>
+            <a:r>
+              <a:rPr lang="en-CA" sz="2000" dirty="0">
+                <a:solidFill>
+                  <a:schemeClr val="tx1">
+                    <a:lumMod val="65000"/>
+                    <a:lumOff val="35000"/>
+                  </a:schemeClr>
+                </a:solidFill>
+                <a:latin typeface="Segoe UI Light" pitchFamily="34" charset="0"/>
+              </a:rPr>
+              <a:t>Hotfix</a:t>
+            </a:r>
+          </a:p>
+        </p:txBody>
+      </p:sp>
+      <p:sp>
+        <p:nvSpPr>
+          <p:cNvPr id="58" name="TextBox 57">
+            <a:extLst>
+              <a:ext uri="{FF2B5EF4-FFF2-40B4-BE49-F238E27FC236}">
+                <a16:creationId xmlns:a16="http://schemas.microsoft.com/office/drawing/2014/main" id="{EF0FA4B3-860E-4B50-AA0E-CD617C50FFB8}"/>
+              </a:ext>
+            </a:extLst>
+          </p:cNvPr>
+          <p:cNvSpPr txBox="1"/>
+          <p:nvPr/>
+        </p:nvSpPr>
+        <p:spPr>
+          <a:xfrm>
+            <a:off x="9497181" y="4181306"/>
+            <a:ext cx="625171" cy="307777"/>
+          </a:xfrm>
+          <a:prstGeom prst="rect">
+            <a:avLst/>
+          </a:prstGeom>
+          <a:noFill/>
+        </p:spPr>
+        <p:txBody>
+          <a:bodyPr wrap="none" lIns="0" tIns="0" rIns="0" bIns="0" rtlCol="0">
+            <a:spAutoFit/>
+          </a:bodyPr>
+          <a:lstStyle/>
+          <a:p>
+            <a:r>
+              <a:rPr lang="en-CA" sz="2000" dirty="0">
+                <a:solidFill>
+                  <a:schemeClr val="tx1">
+                    <a:lumMod val="65000"/>
+                    <a:lumOff val="35000"/>
+                  </a:schemeClr>
+                </a:solidFill>
+                <a:latin typeface="Segoe UI Light" pitchFamily="34" charset="0"/>
+              </a:rPr>
+              <a:t>Hotfix</a:t>
             </a:r>
           </a:p>
         </p:txBody>

</xml_diff>